<commit_message>
adding all DBMS work
</commit_message>
<xml_diff>
--- a/DBMS Unit 1_2.pptx
+++ b/DBMS Unit 1_2.pptx
@@ -2,120 +2,120 @@
 <file path=ppt/presentation.xml><?xml version="1.0" encoding="utf-8"?>
 <p:presentation xmlns:a="http://schemas.openxmlformats.org/drawingml/2006/main" xmlns:r="http://schemas.openxmlformats.org/officeDocument/2006/relationships" xmlns:p="http://schemas.openxmlformats.org/presentationml/2006/main" showSpecialPlsOnTitleSld="0" saveSubsetFonts="1">
   <p:sldMasterIdLst>
-    <p:sldMasterId id="2147483704" r:id="rId1"/>
+    <p:sldMasterId id="2147483704" r:id="rId4"/>
   </p:sldMasterIdLst>
   <p:notesMasterIdLst>
-    <p:notesMasterId r:id="rId102"/>
+    <p:notesMasterId r:id="rId105"/>
   </p:notesMasterIdLst>
   <p:handoutMasterIdLst>
-    <p:handoutMasterId r:id="rId103"/>
+    <p:handoutMasterId r:id="rId106"/>
   </p:handoutMasterIdLst>
   <p:sldIdLst>
-    <p:sldId id="483" r:id="rId2"/>
-    <p:sldId id="265" r:id="rId3"/>
-    <p:sldId id="333" r:id="rId4"/>
-    <p:sldId id="314" r:id="rId5"/>
-    <p:sldId id="336" r:id="rId6"/>
-    <p:sldId id="276" r:id="rId7"/>
-    <p:sldId id="415" r:id="rId8"/>
-    <p:sldId id="414" r:id="rId9"/>
-    <p:sldId id="275" r:id="rId10"/>
-    <p:sldId id="337" r:id="rId11"/>
-    <p:sldId id="417" r:id="rId12"/>
-    <p:sldId id="355" r:id="rId13"/>
-    <p:sldId id="338" r:id="rId14"/>
-    <p:sldId id="403" r:id="rId15"/>
-    <p:sldId id="404" r:id="rId16"/>
-    <p:sldId id="443" r:id="rId17"/>
-    <p:sldId id="419" r:id="rId18"/>
-    <p:sldId id="416" r:id="rId19"/>
-    <p:sldId id="449" r:id="rId20"/>
-    <p:sldId id="450" r:id="rId21"/>
-    <p:sldId id="342" r:id="rId22"/>
-    <p:sldId id="418" r:id="rId23"/>
-    <p:sldId id="339" r:id="rId24"/>
-    <p:sldId id="475" r:id="rId25"/>
-    <p:sldId id="360" r:id="rId26"/>
-    <p:sldId id="340" r:id="rId27"/>
-    <p:sldId id="476" r:id="rId28"/>
-    <p:sldId id="341" r:id="rId29"/>
-    <p:sldId id="477" r:id="rId30"/>
-    <p:sldId id="354" r:id="rId31"/>
-    <p:sldId id="420" r:id="rId32"/>
-    <p:sldId id="408" r:id="rId33"/>
-    <p:sldId id="409" r:id="rId34"/>
-    <p:sldId id="410" r:id="rId35"/>
-    <p:sldId id="478" r:id="rId36"/>
-    <p:sldId id="479" r:id="rId37"/>
-    <p:sldId id="480" r:id="rId38"/>
-    <p:sldId id="481" r:id="rId39"/>
-    <p:sldId id="482" r:id="rId40"/>
-    <p:sldId id="421" r:id="rId41"/>
-    <p:sldId id="373" r:id="rId42"/>
-    <p:sldId id="422" r:id="rId43"/>
-    <p:sldId id="423" r:id="rId44"/>
-    <p:sldId id="424" r:id="rId45"/>
-    <p:sldId id="425" r:id="rId46"/>
-    <p:sldId id="358" r:id="rId47"/>
-    <p:sldId id="350" r:id="rId48"/>
-    <p:sldId id="411" r:id="rId49"/>
-    <p:sldId id="412" r:id="rId50"/>
-    <p:sldId id="376" r:id="rId51"/>
-    <p:sldId id="426" r:id="rId52"/>
-    <p:sldId id="427" r:id="rId53"/>
-    <p:sldId id="428" r:id="rId54"/>
-    <p:sldId id="451" r:id="rId55"/>
-    <p:sldId id="429" r:id="rId56"/>
-    <p:sldId id="430" r:id="rId57"/>
-    <p:sldId id="431" r:id="rId58"/>
-    <p:sldId id="432" r:id="rId59"/>
-    <p:sldId id="452" r:id="rId60"/>
-    <p:sldId id="433" r:id="rId61"/>
-    <p:sldId id="434" r:id="rId62"/>
-    <p:sldId id="378" r:id="rId63"/>
-    <p:sldId id="379" r:id="rId64"/>
-    <p:sldId id="453" r:id="rId65"/>
-    <p:sldId id="454" r:id="rId66"/>
-    <p:sldId id="455" r:id="rId67"/>
-    <p:sldId id="456" r:id="rId68"/>
-    <p:sldId id="457" r:id="rId69"/>
-    <p:sldId id="458" r:id="rId70"/>
-    <p:sldId id="459" r:id="rId71"/>
-    <p:sldId id="460" r:id="rId72"/>
-    <p:sldId id="461" r:id="rId73"/>
-    <p:sldId id="462" r:id="rId74"/>
-    <p:sldId id="474" r:id="rId75"/>
-    <p:sldId id="463" r:id="rId76"/>
-    <p:sldId id="464" r:id="rId77"/>
-    <p:sldId id="465" r:id="rId78"/>
-    <p:sldId id="466" r:id="rId79"/>
-    <p:sldId id="467" r:id="rId80"/>
-    <p:sldId id="468" r:id="rId81"/>
-    <p:sldId id="469" r:id="rId82"/>
-    <p:sldId id="470" r:id="rId83"/>
-    <p:sldId id="471" r:id="rId84"/>
-    <p:sldId id="473" r:id="rId85"/>
-    <p:sldId id="472" r:id="rId86"/>
-    <p:sldId id="384" r:id="rId87"/>
-    <p:sldId id="385" r:id="rId88"/>
-    <p:sldId id="386" r:id="rId89"/>
-    <p:sldId id="387" r:id="rId90"/>
-    <p:sldId id="388" r:id="rId91"/>
-    <p:sldId id="389" r:id="rId92"/>
-    <p:sldId id="390" r:id="rId93"/>
-    <p:sldId id="391" r:id="rId94"/>
-    <p:sldId id="392" r:id="rId95"/>
-    <p:sldId id="393" r:id="rId96"/>
-    <p:sldId id="394" r:id="rId97"/>
-    <p:sldId id="395" r:id="rId98"/>
-    <p:sldId id="396" r:id="rId99"/>
-    <p:sldId id="401" r:id="rId100"/>
-    <p:sldId id="402" r:id="rId101"/>
+    <p:sldId id="483" r:id="rId5"/>
+    <p:sldId id="265" r:id="rId6"/>
+    <p:sldId id="333" r:id="rId7"/>
+    <p:sldId id="314" r:id="rId8"/>
+    <p:sldId id="336" r:id="rId9"/>
+    <p:sldId id="276" r:id="rId10"/>
+    <p:sldId id="415" r:id="rId11"/>
+    <p:sldId id="414" r:id="rId12"/>
+    <p:sldId id="275" r:id="rId13"/>
+    <p:sldId id="337" r:id="rId14"/>
+    <p:sldId id="417" r:id="rId15"/>
+    <p:sldId id="355" r:id="rId16"/>
+    <p:sldId id="338" r:id="rId17"/>
+    <p:sldId id="403" r:id="rId18"/>
+    <p:sldId id="404" r:id="rId19"/>
+    <p:sldId id="443" r:id="rId20"/>
+    <p:sldId id="419" r:id="rId21"/>
+    <p:sldId id="416" r:id="rId22"/>
+    <p:sldId id="449" r:id="rId23"/>
+    <p:sldId id="450" r:id="rId24"/>
+    <p:sldId id="342" r:id="rId25"/>
+    <p:sldId id="418" r:id="rId26"/>
+    <p:sldId id="339" r:id="rId27"/>
+    <p:sldId id="475" r:id="rId28"/>
+    <p:sldId id="360" r:id="rId29"/>
+    <p:sldId id="340" r:id="rId30"/>
+    <p:sldId id="476" r:id="rId31"/>
+    <p:sldId id="341" r:id="rId32"/>
+    <p:sldId id="477" r:id="rId33"/>
+    <p:sldId id="354" r:id="rId34"/>
+    <p:sldId id="420" r:id="rId35"/>
+    <p:sldId id="408" r:id="rId36"/>
+    <p:sldId id="409" r:id="rId37"/>
+    <p:sldId id="410" r:id="rId38"/>
+    <p:sldId id="478" r:id="rId39"/>
+    <p:sldId id="479" r:id="rId40"/>
+    <p:sldId id="480" r:id="rId41"/>
+    <p:sldId id="481" r:id="rId42"/>
+    <p:sldId id="482" r:id="rId43"/>
+    <p:sldId id="421" r:id="rId44"/>
+    <p:sldId id="373" r:id="rId45"/>
+    <p:sldId id="422" r:id="rId46"/>
+    <p:sldId id="423" r:id="rId47"/>
+    <p:sldId id="424" r:id="rId48"/>
+    <p:sldId id="425" r:id="rId49"/>
+    <p:sldId id="358" r:id="rId50"/>
+    <p:sldId id="350" r:id="rId51"/>
+    <p:sldId id="411" r:id="rId52"/>
+    <p:sldId id="412" r:id="rId53"/>
+    <p:sldId id="376" r:id="rId54"/>
+    <p:sldId id="426" r:id="rId55"/>
+    <p:sldId id="427" r:id="rId56"/>
+    <p:sldId id="428" r:id="rId57"/>
+    <p:sldId id="451" r:id="rId58"/>
+    <p:sldId id="429" r:id="rId59"/>
+    <p:sldId id="430" r:id="rId60"/>
+    <p:sldId id="431" r:id="rId61"/>
+    <p:sldId id="432" r:id="rId62"/>
+    <p:sldId id="452" r:id="rId63"/>
+    <p:sldId id="433" r:id="rId64"/>
+    <p:sldId id="434" r:id="rId65"/>
+    <p:sldId id="378" r:id="rId66"/>
+    <p:sldId id="379" r:id="rId67"/>
+    <p:sldId id="453" r:id="rId68"/>
+    <p:sldId id="454" r:id="rId69"/>
+    <p:sldId id="455" r:id="rId70"/>
+    <p:sldId id="456" r:id="rId71"/>
+    <p:sldId id="457" r:id="rId72"/>
+    <p:sldId id="458" r:id="rId73"/>
+    <p:sldId id="459" r:id="rId74"/>
+    <p:sldId id="460" r:id="rId75"/>
+    <p:sldId id="461" r:id="rId76"/>
+    <p:sldId id="462" r:id="rId77"/>
+    <p:sldId id="474" r:id="rId78"/>
+    <p:sldId id="463" r:id="rId79"/>
+    <p:sldId id="464" r:id="rId80"/>
+    <p:sldId id="465" r:id="rId81"/>
+    <p:sldId id="466" r:id="rId82"/>
+    <p:sldId id="467" r:id="rId83"/>
+    <p:sldId id="468" r:id="rId84"/>
+    <p:sldId id="469" r:id="rId85"/>
+    <p:sldId id="470" r:id="rId86"/>
+    <p:sldId id="471" r:id="rId87"/>
+    <p:sldId id="473" r:id="rId88"/>
+    <p:sldId id="472" r:id="rId89"/>
+    <p:sldId id="384" r:id="rId90"/>
+    <p:sldId id="385" r:id="rId91"/>
+    <p:sldId id="386" r:id="rId92"/>
+    <p:sldId id="387" r:id="rId93"/>
+    <p:sldId id="388" r:id="rId94"/>
+    <p:sldId id="389" r:id="rId95"/>
+    <p:sldId id="390" r:id="rId96"/>
+    <p:sldId id="391" r:id="rId97"/>
+    <p:sldId id="392" r:id="rId98"/>
+    <p:sldId id="393" r:id="rId99"/>
+    <p:sldId id="394" r:id="rId100"/>
+    <p:sldId id="395" r:id="rId101"/>
+    <p:sldId id="396" r:id="rId102"/>
+    <p:sldId id="401" r:id="rId103"/>
+    <p:sldId id="402" r:id="rId104"/>
   </p:sldIdLst>
   <p:sldSz cx="9144000" cy="6858000" type="screen4x3"/>
   <p:notesSz cx="6858000" cy="9144000"/>
   <p:custDataLst>
-    <p:tags r:id="rId104"/>
+    <p:tags r:id="rId107"/>
   </p:custDataLst>
   <p:defaultTextStyle>
     <a:defPPr>
@@ -275,6 +275,52 @@
 </p:presentation>
 </file>
 
+<file path=ppt/revisionInfo.xml><?xml version="1.0" encoding="utf-8"?>
+<p1510:revInfo xmlns:a="http://schemas.openxmlformats.org/drawingml/2006/main" xmlns:r="http://schemas.openxmlformats.org/officeDocument/2006/relationships" xmlns:p1510="http://schemas.microsoft.com/office/powerpoint/2015/10/main">
+  <p1510:revLst>
+    <p1510:client id="{3E835B48-ACEB-42A3-B279-11C6D0B5AA15}" v="1" dt="2021-04-24T16:14:54.601"/>
+    <p1510:client id="{B7C54905-A2BC-4E4E-AF59-9C80AEAD12BE}" v="1" dt="2021-04-24T16:14:00.127"/>
+  </p1510:revLst>
+</p1510:revInfo>
+</file>
+
+<file path=ppt/changesInfos/changesInfo1.xml><?xml version="1.0" encoding="utf-8"?>
+<pc:chgInfo xmlns:a="http://schemas.openxmlformats.org/drawingml/2006/main" xmlns:r="http://schemas.openxmlformats.org/officeDocument/2006/relationships" xmlns:ac="http://schemas.microsoft.com/office/drawing/2013/main/command" xmlns:pc="http://schemas.microsoft.com/office/powerpoint/2013/main/command">
+  <pc:docChgLst>
+    <pc:chgData name="13114802719" userId="S::parv.13114802719@cse.mait.ac.in::d2981ebd-6dcd-445a-aa68-0dc765093ac9" providerId="AD" clId="Web-{B7C54905-A2BC-4E4E-AF59-9C80AEAD12BE}"/>
+    <pc:docChg chg="addSld">
+      <pc:chgData name="13114802719" userId="S::parv.13114802719@cse.mait.ac.in::d2981ebd-6dcd-445a-aa68-0dc765093ac9" providerId="AD" clId="Web-{B7C54905-A2BC-4E4E-AF59-9C80AEAD12BE}" dt="2021-04-24T16:14:00.127" v="0"/>
+      <pc:docMkLst>
+        <pc:docMk/>
+      </pc:docMkLst>
+      <pc:sldChg chg="new">
+        <pc:chgData name="13114802719" userId="S::parv.13114802719@cse.mait.ac.in::d2981ebd-6dcd-445a-aa68-0dc765093ac9" providerId="AD" clId="Web-{B7C54905-A2BC-4E4E-AF59-9C80AEAD12BE}" dt="2021-04-24T16:14:00.127" v="0"/>
+        <pc:sldMkLst>
+          <pc:docMk/>
+          <pc:sldMk cId="3284200805" sldId="484"/>
+        </pc:sldMkLst>
+      </pc:sldChg>
+    </pc:docChg>
+  </pc:docChgLst>
+  <pc:docChgLst>
+    <pc:chgData name="13114802719" userId="S::parv.13114802719@cse.mait.ac.in::d2981ebd-6dcd-445a-aa68-0dc765093ac9" providerId="AD" clId="Web-{3E835B48-ACEB-42A3-B279-11C6D0B5AA15}"/>
+    <pc:docChg chg="delSld">
+      <pc:chgData name="13114802719" userId="S::parv.13114802719@cse.mait.ac.in::d2981ebd-6dcd-445a-aa68-0dc765093ac9" providerId="AD" clId="Web-{3E835B48-ACEB-42A3-B279-11C6D0B5AA15}" dt="2021-04-24T16:14:54.601" v="0"/>
+      <pc:docMkLst>
+        <pc:docMk/>
+      </pc:docMkLst>
+      <pc:sldChg chg="del">
+        <pc:chgData name="13114802719" userId="S::parv.13114802719@cse.mait.ac.in::d2981ebd-6dcd-445a-aa68-0dc765093ac9" providerId="AD" clId="Web-{3E835B48-ACEB-42A3-B279-11C6D0B5AA15}" dt="2021-04-24T16:14:54.601" v="0"/>
+        <pc:sldMkLst>
+          <pc:docMk/>
+          <pc:sldMk cId="3284200805" sldId="484"/>
+        </pc:sldMkLst>
+      </pc:sldChg>
+    </pc:docChg>
+  </pc:docChgLst>
+</pc:chgInfo>
+</file>
+
 <file path=ppt/handoutMasters/handoutMaster1.xml><?xml version="1.0" encoding="utf-8"?>
 <p:handoutMaster xmlns:a="http://schemas.openxmlformats.org/drawingml/2006/main" xmlns:r="http://schemas.openxmlformats.org/officeDocument/2006/relationships" xmlns:p="http://schemas.openxmlformats.org/presentationml/2006/main">
   <p:cSld>
@@ -1058,7 +1104,7 @@
             <a:fld id="{DE165810-D311-49AB-B4BF-759BAD901AFE}" type="slidenum">
               <a:rPr lang="en-US"/>
               <a:pPr/>
-              <a:t>45</a:t>
+              <a:t>46</a:t>
             </a:fld>
             <a:endParaRPr lang="en-US"/>
           </a:p>
@@ -1152,7 +1198,7 @@
             <a:fld id="{D9E33749-EC04-4178-B072-9BFF6DA4F777}" type="slidenum">
               <a:rPr lang="en-US"/>
               <a:pPr/>
-              <a:t>51</a:t>
+              <a:t>52</a:t>
             </a:fld>
             <a:endParaRPr lang="en-US"/>
           </a:p>
@@ -1246,7 +1292,7 @@
             <a:fld id="{EF69EA34-DFFD-4EDA-96ED-8DCE185632F1}" type="slidenum">
               <a:rPr lang="en-US"/>
               <a:pPr/>
-              <a:t>53</a:t>
+              <a:t>54</a:t>
             </a:fld>
             <a:endParaRPr lang="en-US"/>
           </a:p>
@@ -1340,7 +1386,7 @@
             <a:fld id="{870228C4-EDE8-4844-8CCB-B4C76CE1DDBA}" type="slidenum">
               <a:rPr lang="en-US"/>
               <a:pPr/>
-              <a:t>60</a:t>
+              <a:t>61</a:t>
             </a:fld>
             <a:endParaRPr lang="en-US"/>
           </a:p>
@@ -1434,7 +1480,7 @@
             <a:fld id="{F8DF2542-8451-4519-999F-184B7793B516}" type="slidenum">
               <a:rPr lang="en-US"/>
               <a:pPr/>
-              <a:t>61</a:t>
+              <a:t>62</a:t>
             </a:fld>
             <a:endParaRPr lang="en-US"/>
           </a:p>
@@ -1528,7 +1574,7 @@
             <a:fld id="{6C8B9A1C-6D6C-4E5D-A1C4-8BD727439F65}" type="slidenum">
               <a:rPr lang="en-US"/>
               <a:pPr/>
-              <a:t>65</a:t>
+              <a:t>66</a:t>
             </a:fld>
             <a:endParaRPr lang="en-US"/>
           </a:p>
@@ -1622,7 +1668,7 @@
             <a:fld id="{6CB62A6C-93EB-460A-9525-45CC490ECED8}" type="slidenum">
               <a:rPr lang="en-US"/>
               <a:pPr/>
-              <a:t>66</a:t>
+              <a:t>67</a:t>
             </a:fld>
             <a:endParaRPr lang="en-US"/>
           </a:p>
@@ -1752,7 +1798,7 @@
               <a:pPr>
                 <a:defRPr/>
               </a:pPr>
-              <a:t>70</a:t>
+              <a:t>71</a:t>
             </a:fld>
             <a:endParaRPr lang="en-US"/>
           </a:p>
@@ -1803,7 +1849,7 @@
             <a:fld id="{2EE1887D-D84B-43FF-8B80-2C3B59C2E436}" type="slidenum">
               <a:rPr lang="en-US"/>
               <a:pPr/>
-              <a:t>72</a:t>
+              <a:t>73</a:t>
             </a:fld>
             <a:endParaRPr lang="en-US"/>
           </a:p>
@@ -1897,7 +1943,7 @@
             <a:fld id="{24EB5073-8415-4DE0-8006-1C2116855E66}" type="slidenum">
               <a:rPr lang="en-US"/>
               <a:pPr/>
-              <a:t>73</a:t>
+              <a:t>74</a:t>
             </a:fld>
             <a:endParaRPr lang="en-US"/>
           </a:p>
@@ -1991,7 +2037,7 @@
             <a:fld id="{AF075563-F5E1-4351-BF05-38A8660ED492}" type="slidenum">
               <a:rPr lang="en-US"/>
               <a:pPr/>
-              <a:t>7</a:t>
+              <a:t>8</a:t>
             </a:fld>
             <a:endParaRPr lang="en-US"/>
           </a:p>
@@ -2075,7 +2121,7 @@
             <a:fld id="{195BB414-29D5-4218-879A-70BFF47F04DC}" type="slidenum">
               <a:rPr lang="en-US"/>
               <a:pPr/>
-              <a:t>75</a:t>
+              <a:t>76</a:t>
             </a:fld>
             <a:endParaRPr lang="en-US"/>
           </a:p>
@@ -2169,7 +2215,7 @@
             <a:fld id="{38534766-8719-4CD1-A091-7F29B692DFDA}" type="slidenum">
               <a:rPr lang="en-US"/>
               <a:pPr/>
-              <a:t>76</a:t>
+              <a:t>77</a:t>
             </a:fld>
             <a:endParaRPr lang="en-US"/>
           </a:p>
@@ -2263,7 +2309,7 @@
             <a:fld id="{A003DEFA-2CC8-4FAB-9047-EA62935ED0E5}" type="slidenum">
               <a:rPr lang="en-US"/>
               <a:pPr/>
-              <a:t>77</a:t>
+              <a:t>78</a:t>
             </a:fld>
             <a:endParaRPr lang="en-US"/>
           </a:p>
@@ -2357,7 +2403,7 @@
             <a:fld id="{7BE147A6-48FB-4E74-968F-82361D950D25}" type="slidenum">
               <a:rPr lang="en-US"/>
               <a:pPr/>
-              <a:t>78</a:t>
+              <a:t>79</a:t>
             </a:fld>
             <a:endParaRPr lang="en-US"/>
           </a:p>
@@ -2587,7 +2633,7 @@
             <a:fld id="{7341DBE2-2B7D-48E2-B882-BB8E3DBA2557}" type="slidenum">
               <a:rPr lang="en-US"/>
               <a:pPr/>
-              <a:t>81</a:t>
+              <a:t>82</a:t>
             </a:fld>
             <a:endParaRPr lang="en-US"/>
           </a:p>
@@ -2817,7 +2863,7 @@
             <a:fld id="{C3114C34-8A59-4FA3-AC6F-970462CE4CE6}" type="slidenum">
               <a:rPr lang="en-US"/>
               <a:pPr/>
-              <a:t>82</a:t>
+              <a:t>83</a:t>
             </a:fld>
             <a:endParaRPr lang="en-US"/>
           </a:p>
@@ -3047,7 +3093,7 @@
             <a:fld id="{E7CA3D8A-F703-482C-8192-E37B2FDDF372}" type="slidenum">
               <a:rPr lang="en-US"/>
               <a:pPr/>
-              <a:t>83</a:t>
+              <a:t>84</a:t>
             </a:fld>
             <a:endParaRPr lang="en-US"/>
           </a:p>
@@ -3407,7 +3453,7 @@
             <a:fld id="{01ED5F5A-87ED-4206-ACC1-BDB9B49CCA7F}" type="slidenum">
               <a:rPr lang="en-US"/>
               <a:pPr/>
-              <a:t>11</a:t>
+              <a:t>12</a:t>
             </a:fld>
             <a:endParaRPr lang="en-US"/>
           </a:p>
@@ -3628,7 +3674,7 @@
             <a:fld id="{7A7C5B1E-B387-45BF-89B2-52FAFC9BD336}" type="slidenum">
               <a:rPr lang="en-US"/>
               <a:pPr/>
-              <a:t>17</a:t>
+              <a:t>18</a:t>
             </a:fld>
             <a:endParaRPr lang="en-US"/>
           </a:p>
@@ -3718,7 +3764,7 @@
             <a:fld id="{C1366FB2-6D47-414F-A393-FADE7C59E0E0}" type="slidenum">
               <a:rPr lang="en-US"/>
               <a:pPr/>
-              <a:t>18</a:t>
+              <a:t>19</a:t>
             </a:fld>
             <a:endParaRPr lang="en-US"/>
           </a:p>
@@ -3804,7 +3850,7 @@
             <a:fld id="{13EE6DCC-E334-4063-9DA2-6966A3B9B933}" type="slidenum">
               <a:rPr lang="en-US"/>
               <a:pPr/>
-              <a:t>42</a:t>
+              <a:t>43</a:t>
             </a:fld>
             <a:endParaRPr lang="en-US"/>
           </a:p>
@@ -3898,7 +3944,7 @@
             <a:fld id="{C0E8C6C4-FB1E-4DF6-A853-D07ABBA30157}" type="slidenum">
               <a:rPr lang="en-US"/>
               <a:pPr/>
-              <a:t>44</a:t>
+              <a:t>45</a:t>
             </a:fld>
             <a:endParaRPr lang="en-US"/>
           </a:p>
@@ -8947,12 +8993,12 @@
           <a:graphicData uri="http://schemas.openxmlformats.org/presentationml/2006/ole">
             <mc:AlternateContent xmlns:mc="http://schemas.openxmlformats.org/markup-compatibility/2006">
               <mc:Choice xmlns:v="urn:schemas-microsoft-com:vml" Requires="v">
-                <p:oleObj name="Clip" r:id="rId3" imgW="3848040" imgH="5478120" progId="">
+                <p:oleObj spid="_x0000_s18435" name="Clip" r:id="rId4" imgW="3848040" imgH="5478120" progId="">
                   <p:embed/>
                 </p:oleObj>
               </mc:Choice>
               <mc:Fallback>
-                <p:oleObj name="Clip" r:id="rId3" imgW="3848040" imgH="5478120" progId="">
+                <p:oleObj name="Clip" r:id="rId4" imgW="3848040" imgH="5478120" progId="">
                   <p:embed/>
                   <p:pic>
                     <p:nvPicPr>
@@ -8963,7 +9009,7 @@
                       <p:nvPr/>
                     </p:nvPicPr>
                     <p:blipFill>
-                      <a:blip r:embed="rId4">
+                      <a:blip r:embed="rId5">
                         <a:extLst>
                           <a:ext uri="{28A0092B-C50C-407E-A947-70E740481C1C}">
                             <a14:useLocalDpi xmlns:a14="http://schemas.microsoft.com/office/drawing/2010/main" val="0"/>
@@ -9030,12 +9076,12 @@
           <a:graphicData uri="http://schemas.openxmlformats.org/presentationml/2006/ole">
             <mc:AlternateContent xmlns:mc="http://schemas.openxmlformats.org/markup-compatibility/2006">
               <mc:Choice xmlns:v="urn:schemas-microsoft-com:vml" Requires="v">
-                <p:oleObj name="Clip" r:id="rId5" imgW="4519440" imgH="3466800" progId="">
+                <p:oleObj spid="_x0000_s18436" name="Clip" r:id="rId6" imgW="4519440" imgH="3466800" progId="">
                   <p:embed/>
                 </p:oleObj>
               </mc:Choice>
               <mc:Fallback>
-                <p:oleObj name="Clip" r:id="rId5" imgW="4519440" imgH="3466800" progId="">
+                <p:oleObj name="Clip" r:id="rId6" imgW="4519440" imgH="3466800" progId="">
                   <p:embed/>
                   <p:pic>
                     <p:nvPicPr>
@@ -9046,7 +9092,7 @@
                       <p:nvPr/>
                     </p:nvPicPr>
                     <p:blipFill>
-                      <a:blip r:embed="rId6">
+                      <a:blip r:embed="rId7">
                         <a:extLst>
                           <a:ext uri="{28A0092B-C50C-407E-A947-70E740481C1C}">
                             <a14:useLocalDpi xmlns:a14="http://schemas.microsoft.com/office/drawing/2010/main" val="0"/>
@@ -19014,12 +19060,12 @@
           <a:graphicData uri="http://schemas.openxmlformats.org/presentationml/2006/ole">
             <mc:AlternateContent xmlns:mc="http://schemas.openxmlformats.org/markup-compatibility/2006">
               <mc:Choice xmlns:v="urn:schemas-microsoft-com:vml" Requires="v">
-                <p:oleObj name="Document" r:id="rId3" imgW="2396520" imgH="1706760" progId="Word.Document.8">
+                <p:oleObj spid="_x0000_s60418" name="Document" r:id="rId4" imgW="2396520" imgH="1706760" progId="Word.Document.8">
                   <p:embed/>
                 </p:oleObj>
               </mc:Choice>
               <mc:Fallback>
-                <p:oleObj name="Document" r:id="rId3" imgW="2396520" imgH="1706760" progId="Word.Document.8">
+                <p:oleObj name="Document" r:id="rId4" imgW="2396520" imgH="1706760" progId="Word.Document.8">
                   <p:embed/>
                   <p:pic>
                     <p:nvPicPr>
@@ -19030,7 +19076,7 @@
                       <p:nvPr/>
                     </p:nvPicPr>
                     <p:blipFill>
-                      <a:blip r:embed="rId4">
+                      <a:blip r:embed="rId5">
                         <a:extLst>
                           <a:ext uri="{28A0092B-C50C-407E-A947-70E740481C1C}">
                             <a14:useLocalDpi xmlns:a14="http://schemas.microsoft.com/office/drawing/2010/main" val="0"/>
@@ -26229,12 +26275,12 @@
           <a:graphicData uri="http://schemas.openxmlformats.org/presentationml/2006/ole">
             <mc:AlternateContent xmlns:mc="http://schemas.openxmlformats.org/markup-compatibility/2006">
               <mc:Choice xmlns:v="urn:schemas-microsoft-com:vml" Requires="v">
-                <p:oleObj name="Document" r:id="rId2" imgW="4273353" imgH="1402619" progId="Word.Document.8">
+                <p:oleObj spid="_x0000_s83971" name="Document" r:id="rId3" imgW="4273353" imgH="1402619" progId="Word.Document.8">
                   <p:embed/>
                 </p:oleObj>
               </mc:Choice>
               <mc:Fallback>
-                <p:oleObj name="Document" r:id="rId2" imgW="4273353" imgH="1402619" progId="Word.Document.8">
+                <p:oleObj name="Document" r:id="rId3" imgW="4273353" imgH="1402619" progId="Word.Document.8">
                   <p:embed/>
                   <p:pic>
                     <p:nvPicPr>
@@ -26245,7 +26291,7 @@
                       <p:nvPr/>
                     </p:nvPicPr>
                     <p:blipFill>
-                      <a:blip r:embed="rId3">
+                      <a:blip r:embed="rId4">
                         <a:extLst>
                           <a:ext uri="{28A0092B-C50C-407E-A947-70E740481C1C}">
                             <a14:useLocalDpi xmlns:a14="http://schemas.microsoft.com/office/drawing/2010/main" val="0"/>
@@ -26299,12 +26345,12 @@
           <a:graphicData uri="http://schemas.openxmlformats.org/presentationml/2006/ole">
             <mc:AlternateContent xmlns:mc="http://schemas.openxmlformats.org/markup-compatibility/2006">
               <mc:Choice xmlns:v="urn:schemas-microsoft-com:vml" Requires="v">
-                <p:oleObj name="Document" r:id="rId4" imgW="5200057" imgH="1262070" progId="Word.Document.8">
+                <p:oleObj spid="_x0000_s83972" name="Document" r:id="rId5" imgW="5200057" imgH="1262070" progId="Word.Document.8">
                   <p:embed/>
                 </p:oleObj>
               </mc:Choice>
               <mc:Fallback>
-                <p:oleObj name="Document" r:id="rId4" imgW="5200057" imgH="1262070" progId="Word.Document.8">
+                <p:oleObj name="Document" r:id="rId5" imgW="5200057" imgH="1262070" progId="Word.Document.8">
                   <p:embed/>
                   <p:pic>
                     <p:nvPicPr>
@@ -26315,7 +26361,7 @@
                       <p:nvPr/>
                     </p:nvPicPr>
                     <p:blipFill>
-                      <a:blip r:embed="rId5">
+                      <a:blip r:embed="rId6">
                         <a:extLst>
                           <a:ext uri="{28A0092B-C50C-407E-A947-70E740481C1C}">
                             <a14:useLocalDpi xmlns:a14="http://schemas.microsoft.com/office/drawing/2010/main" val="0"/>
@@ -27147,12 +27193,12 @@
           <a:graphicData uri="http://schemas.openxmlformats.org/presentationml/2006/ole">
             <mc:AlternateContent xmlns:mc="http://schemas.openxmlformats.org/markup-compatibility/2006">
               <mc:Choice xmlns:v="urn:schemas-microsoft-com:vml" Requires="v">
-                <p:oleObj name="Document" r:id="rId2" imgW="4273353" imgH="1402619" progId="Word.Document.8">
+                <p:oleObj spid="_x0000_s84995" name="Document" r:id="rId3" imgW="4273353" imgH="1402619" progId="Word.Document.8">
                   <p:embed/>
                 </p:oleObj>
               </mc:Choice>
               <mc:Fallback>
-                <p:oleObj name="Document" r:id="rId2" imgW="4273353" imgH="1402619" progId="Word.Document.8">
+                <p:oleObj name="Document" r:id="rId3" imgW="4273353" imgH="1402619" progId="Word.Document.8">
                   <p:embed/>
                   <p:pic>
                     <p:nvPicPr>
@@ -27163,7 +27209,7 @@
                       <p:nvPr/>
                     </p:nvPicPr>
                     <p:blipFill>
-                      <a:blip r:embed="rId3">
+                      <a:blip r:embed="rId4">
                         <a:extLst>
                           <a:ext uri="{28A0092B-C50C-407E-A947-70E740481C1C}">
                             <a14:useLocalDpi xmlns:a14="http://schemas.microsoft.com/office/drawing/2010/main" val="0"/>
@@ -27217,12 +27263,12 @@
           <a:graphicData uri="http://schemas.openxmlformats.org/presentationml/2006/ole">
             <mc:AlternateContent xmlns:mc="http://schemas.openxmlformats.org/markup-compatibility/2006">
               <mc:Choice xmlns:v="urn:schemas-microsoft-com:vml" Requires="v">
-                <p:oleObj name="Document" r:id="rId4" imgW="5198040" imgH="1264320" progId="Word.Document.8">
+                <p:oleObj spid="_x0000_s84996" name="Document" r:id="rId5" imgW="5198040" imgH="1264320" progId="Word.Document.8">
                   <p:embed/>
                 </p:oleObj>
               </mc:Choice>
               <mc:Fallback>
-                <p:oleObj name="Document" r:id="rId4" imgW="5198040" imgH="1264320" progId="Word.Document.8">
+                <p:oleObj name="Document" r:id="rId5" imgW="5198040" imgH="1264320" progId="Word.Document.8">
                   <p:embed/>
                   <p:pic>
                     <p:nvPicPr>
@@ -27233,7 +27279,7 @@
                       <p:nvPr/>
                     </p:nvPicPr>
                     <p:blipFill>
-                      <a:blip r:embed="rId5">
+                      <a:blip r:embed="rId6">
                         <a:extLst>
                           <a:ext uri="{28A0092B-C50C-407E-A947-70E740481C1C}">
                             <a14:useLocalDpi xmlns:a14="http://schemas.microsoft.com/office/drawing/2010/main" val="0"/>
@@ -28410,12 +28456,12 @@
           <a:graphicData uri="http://schemas.openxmlformats.org/presentationml/2006/ole">
             <mc:AlternateContent xmlns:mc="http://schemas.openxmlformats.org/markup-compatibility/2006">
               <mc:Choice xmlns:v="urn:schemas-microsoft-com:vml" Requires="v">
-                <p:oleObj name="Document" r:id="rId2" imgW="5200057" imgH="1262070" progId="Word.Document.8">
+                <p:oleObj spid="_x0000_s87044" name="Document" r:id="rId3" imgW="5200057" imgH="1262070" progId="Word.Document.8">
                   <p:embed/>
                 </p:oleObj>
               </mc:Choice>
               <mc:Fallback>
-                <p:oleObj name="Document" r:id="rId2" imgW="5200057" imgH="1262070" progId="Word.Document.8">
+                <p:oleObj name="Document" r:id="rId3" imgW="5200057" imgH="1262070" progId="Word.Document.8">
                   <p:embed/>
                   <p:pic>
                     <p:nvPicPr>
@@ -28426,7 +28472,7 @@
                       <p:nvPr/>
                     </p:nvPicPr>
                     <p:blipFill>
-                      <a:blip r:embed="rId3">
+                      <a:blip r:embed="rId4">
                         <a:extLst>
                           <a:ext uri="{28A0092B-C50C-407E-A947-70E740481C1C}">
                             <a14:useLocalDpi xmlns:a14="http://schemas.microsoft.com/office/drawing/2010/main" val="0"/>
@@ -28525,12 +28571,12 @@
           <a:graphicData uri="http://schemas.openxmlformats.org/presentationml/2006/ole">
             <mc:AlternateContent xmlns:mc="http://schemas.openxmlformats.org/markup-compatibility/2006">
               <mc:Choice xmlns:v="urn:schemas-microsoft-com:vml" Requires="v">
-                <p:oleObj name="Document" r:id="rId4" imgW="5200057" imgH="1262070" progId="Word.Document.8">
+                <p:oleObj spid="_x0000_s87045" name="Document" r:id="rId5" imgW="5200057" imgH="1262070" progId="Word.Document.8">
                   <p:embed/>
                 </p:oleObj>
               </mc:Choice>
               <mc:Fallback>
-                <p:oleObj name="Document" r:id="rId4" imgW="5200057" imgH="1262070" progId="Word.Document.8">
+                <p:oleObj name="Document" r:id="rId5" imgW="5200057" imgH="1262070" progId="Word.Document.8">
                   <p:embed/>
                   <p:pic>
                     <p:nvPicPr>
@@ -28541,7 +28587,7 @@
                       <p:nvPr/>
                     </p:nvPicPr>
                     <p:blipFill>
-                      <a:blip r:embed="rId5">
+                      <a:blip r:embed="rId6">
                         <a:extLst>
                           <a:ext uri="{28A0092B-C50C-407E-A947-70E740481C1C}">
                             <a14:useLocalDpi xmlns:a14="http://schemas.microsoft.com/office/drawing/2010/main" val="0"/>
@@ -28640,12 +28686,12 @@
           <a:graphicData uri="http://schemas.openxmlformats.org/presentationml/2006/ole">
             <mc:AlternateContent xmlns:mc="http://schemas.openxmlformats.org/markup-compatibility/2006">
               <mc:Choice xmlns:v="urn:schemas-microsoft-com:vml" Requires="v">
-                <p:oleObj name="Document" r:id="rId6" imgW="5198040" imgH="1264320" progId="Word.Document.8">
+                <p:oleObj spid="_x0000_s87046" name="Document" r:id="rId7" imgW="5198040" imgH="1264320" progId="Word.Document.8">
                   <p:embed/>
                 </p:oleObj>
               </mc:Choice>
               <mc:Fallback>
-                <p:oleObj name="Document" r:id="rId6" imgW="5198040" imgH="1264320" progId="Word.Document.8">
+                <p:oleObj name="Document" r:id="rId7" imgW="5198040" imgH="1264320" progId="Word.Document.8">
                   <p:embed/>
                   <p:pic>
                     <p:nvPicPr>
@@ -28656,7 +28702,7 @@
                       <p:nvPr/>
                     </p:nvPicPr>
                     <p:blipFill>
-                      <a:blip r:embed="rId7">
+                      <a:blip r:embed="rId8">
                         <a:extLst>
                           <a:ext uri="{28A0092B-C50C-407E-A947-70E740481C1C}">
                             <a14:useLocalDpi xmlns:a14="http://schemas.microsoft.com/office/drawing/2010/main" val="0"/>
@@ -48207,8 +48253,8 @@
 </file>
 
 <file path=customXml/item1.xml><?xml version="1.0" encoding="utf-8"?>
-<ct:contentTypeSchema xmlns:ct="http://schemas.microsoft.com/office/2006/metadata/contentType" xmlns:ma="http://schemas.microsoft.com/office/2006/metadata/properties/metaAttributes" ct:_="" ma:_="" ma:contentTypeName="Document" ma:contentTypeID="0x010100EB28F4A5B7108743983B5F3D6F43D3CA" ma:contentTypeVersion="2" ma:contentTypeDescription="Create a new document." ma:contentTypeScope="" ma:versionID="9459ea6230347e1c14acfdcd5192bcbe">
-  <xsd:schema xmlns:xsd="http://www.w3.org/2001/XMLSchema" xmlns:xs="http://www.w3.org/2001/XMLSchema" xmlns:p="http://schemas.microsoft.com/office/2006/metadata/properties" xmlns:ns2="cf86998d-6c59-4edf-8766-84e7bf90ae28" targetNamespace="http://schemas.microsoft.com/office/2006/metadata/properties" ma:root="true" ma:fieldsID="8504fd1e92d8bbf691e65e874d48909e" ns2:_="">
+<ct:contentTypeSchema xmlns:ct="http://schemas.microsoft.com/office/2006/metadata/contentType" xmlns:ma="http://schemas.microsoft.com/office/2006/metadata/properties/metaAttributes" ct:_="" ma:_="" ma:contentTypeName="Document" ma:contentTypeID="0x010100EB28F4A5B7108743983B5F3D6F43D3CA" ma:contentTypeVersion="6" ma:contentTypeDescription="Create a new document." ma:contentTypeScope="" ma:versionID="5719a6b2db1bf99c457280624dcbc0c7">
+  <xsd:schema xmlns:xsd="http://www.w3.org/2001/XMLSchema" xmlns:xs="http://www.w3.org/2001/XMLSchema" xmlns:p="http://schemas.microsoft.com/office/2006/metadata/properties" xmlns:ns2="cf86998d-6c59-4edf-8766-84e7bf90ae28" targetNamespace="http://schemas.microsoft.com/office/2006/metadata/properties" ma:root="true" ma:fieldsID="efeaa22e7f7e1f82b156801268dcb72d" ns2:_="">
     <xsd:import namespace="cf86998d-6c59-4edf-8766-84e7bf90ae28"/>
     <xsd:element name="properties">
       <xsd:complexType>
@@ -48218,6 +48264,10 @@
               <xsd:all>
                 <xsd:element ref="ns2:MediaServiceMetadata" minOccurs="0"/>
                 <xsd:element ref="ns2:MediaServiceFastMetadata" minOccurs="0"/>
+                <xsd:element ref="ns2:MediaServiceAutoTags" minOccurs="0"/>
+                <xsd:element ref="ns2:MediaServiceOCR" minOccurs="0"/>
+                <xsd:element ref="ns2:MediaServiceGenerationTime" minOccurs="0"/>
+                <xsd:element ref="ns2:MediaServiceEventHashCode" minOccurs="0"/>
               </xsd:all>
             </xsd:complexType>
           </xsd:element>
@@ -48236,6 +48286,28 @@
     <xsd:element name="MediaServiceFastMetadata" ma:index="9" nillable="true" ma:displayName="MediaServiceFastMetadata" ma:hidden="true" ma:internalName="MediaServiceFastMetadata" ma:readOnly="true">
       <xsd:simpleType>
         <xsd:restriction base="dms:Note"/>
+      </xsd:simpleType>
+    </xsd:element>
+    <xsd:element name="MediaServiceAutoTags" ma:index="10" nillable="true" ma:displayName="Tags" ma:internalName="MediaServiceAutoTags" ma:readOnly="true">
+      <xsd:simpleType>
+        <xsd:restriction base="dms:Text"/>
+      </xsd:simpleType>
+    </xsd:element>
+    <xsd:element name="MediaServiceOCR" ma:index="11" nillable="true" ma:displayName="Extracted Text" ma:internalName="MediaServiceOCR" ma:readOnly="true">
+      <xsd:simpleType>
+        <xsd:restriction base="dms:Note">
+          <xsd:maxLength value="255"/>
+        </xsd:restriction>
+      </xsd:simpleType>
+    </xsd:element>
+    <xsd:element name="MediaServiceGenerationTime" ma:index="12" nillable="true" ma:displayName="MediaServiceGenerationTime" ma:hidden="true" ma:internalName="MediaServiceGenerationTime" ma:readOnly="true">
+      <xsd:simpleType>
+        <xsd:restriction base="dms:Text"/>
+      </xsd:simpleType>
+    </xsd:element>
+    <xsd:element name="MediaServiceEventHashCode" ma:index="13" nillable="true" ma:displayName="MediaServiceEventHashCode" ma:hidden="true" ma:internalName="MediaServiceEventHashCode" ma:readOnly="true">
+      <xsd:simpleType>
+        <xsd:restriction base="dms:Text"/>
       </xsd:simpleType>
     </xsd:element>
   </xsd:schema>
@@ -48354,13 +48426,36 @@
 </file>
 
 <file path=customXml/itemProps1.xml><?xml version="1.0" encoding="utf-8"?>
-<ds:datastoreItem xmlns:ds="http://schemas.openxmlformats.org/officeDocument/2006/customXml" ds:itemID="{28EA0F35-81B2-47A9-A2E8-35918EB15202}"/>
+<ds:datastoreItem xmlns:ds="http://schemas.openxmlformats.org/officeDocument/2006/customXml" ds:itemID="{B4575383-F9AF-43A9-8AD3-343DAFC8D0EC}">
+  <ds:schemaRefs>
+    <ds:schemaRef ds:uri="http://schemas.microsoft.com/office/2006/metadata/contentType"/>
+    <ds:schemaRef ds:uri="http://schemas.microsoft.com/office/2006/metadata/properties/metaAttributes"/>
+    <ds:schemaRef ds:uri="http://www.w3.org/2001/XMLSchema"/>
+    <ds:schemaRef ds:uri="http://schemas.microsoft.com/office/2006/metadata/properties"/>
+    <ds:schemaRef ds:uri="cf86998d-6c59-4edf-8766-84e7bf90ae28"/>
+    <ds:schemaRef ds:uri="http://schemas.microsoft.com/office/2006/documentManagement/types"/>
+    <ds:schemaRef ds:uri="http://schemas.microsoft.com/office/infopath/2007/PartnerControls"/>
+    <ds:schemaRef ds:uri="http://schemas.openxmlformats.org/package/2006/metadata/core-properties"/>
+    <ds:schemaRef ds:uri="http://purl.org/dc/elements/1.1/"/>
+    <ds:schemaRef ds:uri="http://purl.org/dc/terms/"/>
+    <ds:schemaRef ds:uri="http://schemas.microsoft.com/internal/obd"/>
+  </ds:schemaRefs>
+</ds:datastoreItem>
 </file>
 
 <file path=customXml/itemProps2.xml><?xml version="1.0" encoding="utf-8"?>
-<ds:datastoreItem xmlns:ds="http://schemas.openxmlformats.org/officeDocument/2006/customXml" ds:itemID="{65AD9FB3-3364-4E9B-8428-944F76AF0E9D}"/>
+<ds:datastoreItem xmlns:ds="http://schemas.openxmlformats.org/officeDocument/2006/customXml" ds:itemID="{65AD9FB3-3364-4E9B-8428-944F76AF0E9D}">
+  <ds:schemaRefs>
+    <ds:schemaRef ds:uri="http://schemas.microsoft.com/sharepoint/v3/contenttype/forms"/>
+  </ds:schemaRefs>
+</ds:datastoreItem>
 </file>
 
 <file path=customXml/itemProps3.xml><?xml version="1.0" encoding="utf-8"?>
-<ds:datastoreItem xmlns:ds="http://schemas.openxmlformats.org/officeDocument/2006/customXml" ds:itemID="{4951892B-667E-4A1D-9DC4-BE9D2E61DFC2}"/>
+<ds:datastoreItem xmlns:ds="http://schemas.openxmlformats.org/officeDocument/2006/customXml" ds:itemID="{4951892B-667E-4A1D-9DC4-BE9D2E61DFC2}">
+  <ds:schemaRefs>
+    <ds:schemaRef ds:uri="http://schemas.microsoft.com/office/2006/metadata/properties"/>
+    <ds:schemaRef ds:uri="http://schemas.microsoft.com/office/infopath/2007/PartnerControls"/>
+  </ds:schemaRefs>
+</ds:datastoreItem>
 </file>
</xml_diff>